<commit_message>
Añado carpeta de AppGastos
</commit_message>
<xml_diff>
--- a/ProyectosPersonales/ProcesosCPU/Documentación Planificador.pptx
+++ b/ProyectosPersonales/ProcesosCPU/Documentación Planificador.pptx
@@ -14,7 +14,6 @@
     <p:sldId id="262" r:id="rId8"/>
     <p:sldId id="263" r:id="rId9"/>
     <p:sldId id="264" r:id="rId10"/>
-    <p:sldId id="265" r:id="rId11"/>
   </p:sldIdLst>
   <p:sldSz cx="12192000" cy="6858000"/>
   <p:notesSz cx="6858000" cy="9144000"/>
@@ -113,6 +112,11 @@
       </a:defRPr>
     </a:lvl9pPr>
   </p:defaultTextStyle>
+  <p:extLst>
+    <p:ext uri="{EFAFB233-063F-42B5-8137-9DF3F51BA10A}">
+      <p15:sldGuideLst xmlns:p15="http://schemas.microsoft.com/office/powerpoint/2012/main"/>
+    </p:ext>
+  </p:extLst>
 </p:presentation>
 </file>
 
@@ -303,7 +307,7 @@
             <a:fld id="{08B9EBBA-996F-894A-B54A-D6246ED52CEA}" type="datetimeFigureOut">
               <a:rPr lang="en-US" smtClean="0"/>
               <a:pPr/>
-              <a:t>6/4/2021</a:t>
+              <a:t>6/6/2021</a:t>
             </a:fld>
             <a:endParaRPr lang="en-US" dirty="0"/>
           </a:p>
@@ -580,7 +584,7 @@
             <a:fld id="{09B482E8-6E0E-1B4F-B1FD-C69DB9E858D9}" type="datetimeFigureOut">
               <a:rPr lang="en-US" smtClean="0"/>
               <a:pPr/>
-              <a:t>6/4/2021</a:t>
+              <a:t>6/6/2021</a:t>
             </a:fld>
             <a:endParaRPr lang="en-US" dirty="0"/>
           </a:p>
@@ -777,7 +781,7 @@
             <a:fld id="{09B482E8-6E0E-1B4F-B1FD-C69DB9E858D9}" type="datetimeFigureOut">
               <a:rPr lang="en-US" smtClean="0"/>
               <a:pPr/>
-              <a:t>6/4/2021</a:t>
+              <a:t>6/6/2021</a:t>
             </a:fld>
             <a:endParaRPr lang="en-US" dirty="0"/>
           </a:p>
@@ -1053,7 +1057,7 @@
             <a:fld id="{09B482E8-6E0E-1B4F-B1FD-C69DB9E858D9}" type="datetimeFigureOut">
               <a:rPr lang="en-US" smtClean="0"/>
               <a:pPr/>
-              <a:t>6/4/2021</a:t>
+              <a:t>6/6/2021</a:t>
             </a:fld>
             <a:endParaRPr lang="en-US" dirty="0"/>
           </a:p>
@@ -1397,7 +1401,7 @@
             <a:fld id="{09B482E8-6E0E-1B4F-B1FD-C69DB9E858D9}" type="datetimeFigureOut">
               <a:rPr lang="en-US" smtClean="0"/>
               <a:pPr/>
-              <a:t>6/4/2021</a:t>
+              <a:t>6/6/2021</a:t>
             </a:fld>
             <a:endParaRPr lang="en-US" dirty="0"/>
           </a:p>
@@ -2023,7 +2027,7 @@
             <a:fld id="{09B482E8-6E0E-1B4F-B1FD-C69DB9E858D9}" type="datetimeFigureOut">
               <a:rPr lang="en-US" smtClean="0"/>
               <a:pPr/>
-              <a:t>6/4/2021</a:t>
+              <a:t>6/6/2021</a:t>
             </a:fld>
             <a:endParaRPr lang="en-US" dirty="0"/>
           </a:p>
@@ -2886,7 +2890,7 @@
             <a:fld id="{09B482E8-6E0E-1B4F-B1FD-C69DB9E858D9}" type="datetimeFigureOut">
               <a:rPr lang="en-US" smtClean="0"/>
               <a:pPr/>
-              <a:t>6/4/2021</a:t>
+              <a:t>6/6/2021</a:t>
             </a:fld>
             <a:endParaRPr lang="en-US" dirty="0"/>
           </a:p>
@@ -3059,7 +3063,7 @@
             <a:fld id="{C6C52C72-DE31-F449-A4ED-4C594FD91407}" type="datetimeFigureOut">
               <a:rPr lang="en-US" smtClean="0"/>
               <a:pPr/>
-              <a:t>6/4/2021</a:t>
+              <a:t>6/6/2021</a:t>
             </a:fld>
             <a:endParaRPr lang="en-US" dirty="0"/>
           </a:p>
@@ -3241,7 +3245,7 @@
             <a:fld id="{ED62726E-379B-B349-9EED-81ED093FA806}" type="datetimeFigureOut">
               <a:rPr lang="en-US" smtClean="0"/>
               <a:pPr/>
-              <a:t>6/4/2021</a:t>
+              <a:t>6/6/2021</a:t>
             </a:fld>
             <a:endParaRPr lang="en-US" dirty="0"/>
           </a:p>
@@ -3413,7 +3417,7 @@
             <a:fld id="{9B3A1323-8D79-1946-B0D7-40001CF92E9D}" type="datetimeFigureOut">
               <a:rPr lang="en-US" smtClean="0"/>
               <a:pPr/>
-              <a:t>6/4/2021</a:t>
+              <a:t>6/6/2021</a:t>
             </a:fld>
             <a:endParaRPr lang="en-US" dirty="0"/>
           </a:p>
@@ -3662,7 +3666,7 @@
             <a:fld id="{8DFA1846-DA80-1C48-A609-854EA85C59AD}" type="datetimeFigureOut">
               <a:rPr lang="en-US" smtClean="0"/>
               <a:pPr/>
-              <a:t>6/4/2021</a:t>
+              <a:t>6/6/2021</a:t>
             </a:fld>
             <a:endParaRPr lang="en-US" dirty="0"/>
           </a:p>
@@ -3956,7 +3960,7 @@
             <a:fld id="{57302355-E14B-8545-A8F8-0FE83CC9D524}" type="datetimeFigureOut">
               <a:rPr lang="en-US" smtClean="0"/>
               <a:pPr/>
-              <a:t>6/4/2021</a:t>
+              <a:t>6/6/2021</a:t>
             </a:fld>
             <a:endParaRPr lang="en-US" dirty="0"/>
           </a:p>
@@ -4402,7 +4406,7 @@
             <a:fld id="{02640F58-564D-2B4F-AE67-E407BA4FCF45}" type="datetimeFigureOut">
               <a:rPr lang="en-US" smtClean="0"/>
               <a:pPr/>
-              <a:t>6/4/2021</a:t>
+              <a:t>6/6/2021</a:t>
             </a:fld>
             <a:endParaRPr lang="en-US" dirty="0"/>
           </a:p>
@@ -4522,7 +4526,7 @@
             <a:fld id="{F13A34C8-038E-2045-AF43-DF7DBB8E0E9E}" type="datetimeFigureOut">
               <a:rPr lang="en-US" smtClean="0"/>
               <a:pPr/>
-              <a:t>6/4/2021</a:t>
+              <a:t>6/6/2021</a:t>
             </a:fld>
             <a:endParaRPr lang="en-US" dirty="0"/>
           </a:p>
@@ -4619,7 +4623,7 @@
             <a:fld id="{8818C68F-D26B-8F47-958C-23B49CF8A634}" type="datetimeFigureOut">
               <a:rPr lang="en-US" smtClean="0"/>
               <a:pPr/>
-              <a:t>6/4/2021</a:t>
+              <a:t>6/6/2021</a:t>
             </a:fld>
             <a:endParaRPr lang="en-US" dirty="0"/>
           </a:p>
@@ -4900,7 +4904,7 @@
             <a:fld id="{D0DF5E60-9974-AC48-9591-99C2BB44B7CF}" type="datetimeFigureOut">
               <a:rPr lang="en-US" smtClean="0"/>
               <a:pPr/>
-              <a:t>6/4/2021</a:t>
+              <a:t>6/6/2021</a:t>
             </a:fld>
             <a:endParaRPr lang="en-US" dirty="0"/>
           </a:p>
@@ -5177,7 +5181,7 @@
             <a:fld id="{09B482E8-6E0E-1B4F-B1FD-C69DB9E858D9}" type="datetimeFigureOut">
               <a:rPr lang="en-US" smtClean="0"/>
               <a:pPr/>
-              <a:t>6/4/2021</a:t>
+              <a:t>6/6/2021</a:t>
             </a:fld>
             <a:endParaRPr lang="en-US" dirty="0"/>
           </a:p>
@@ -5609,7 +5613,7 @@
             <a:fld id="{09B482E8-6E0E-1B4F-B1FD-C69DB9E858D9}" type="datetimeFigureOut">
               <a:rPr lang="en-US" smtClean="0"/>
               <a:pPr/>
-              <a:t>6/4/2021</a:t>
+              <a:t>6/6/2021</a:t>
             </a:fld>
             <a:endParaRPr lang="en-US" dirty="0"/>
           </a:p>
@@ -6224,427 +6228,6 @@
 </p:sld>
 </file>
 
-<file path=ppt/slides/slide10.xml><?xml version="1.0" encoding="utf-8"?>
-<p:sld xmlns:a="http://schemas.openxmlformats.org/drawingml/2006/main" xmlns:r="http://schemas.openxmlformats.org/officeDocument/2006/relationships" xmlns:p="http://schemas.openxmlformats.org/presentationml/2006/main">
-  <p:cSld>
-    <p:spTree>
-      <p:nvGrpSpPr>
-        <p:cNvPr id="1" name=""/>
-        <p:cNvGrpSpPr/>
-        <p:nvPr/>
-      </p:nvGrpSpPr>
-      <p:grpSpPr>
-        <a:xfrm>
-          <a:off x="0" y="0"/>
-          <a:ext cx="0" cy="0"/>
-          <a:chOff x="0" y="0"/>
-          <a:chExt cx="0" cy="0"/>
-        </a:xfrm>
-      </p:grpSpPr>
-      <p:sp>
-        <p:nvSpPr>
-          <p:cNvPr id="4" name="CuadroTexto 3">
-            <a:extLst>
-              <a:ext uri="{FF2B5EF4-FFF2-40B4-BE49-F238E27FC236}">
-                <a16:creationId xmlns:a16="http://schemas.microsoft.com/office/drawing/2014/main" id="{B1278A45-CA12-48DC-A6E5-3D79C5801F92}"/>
-              </a:ext>
-            </a:extLst>
-          </p:cNvPr>
-          <p:cNvSpPr txBox="1"/>
-          <p:nvPr/>
-        </p:nvSpPr>
-        <p:spPr>
-          <a:xfrm>
-            <a:off x="337844" y="2268652"/>
-            <a:ext cx="5168293" cy="2031325"/>
-          </a:xfrm>
-          <a:prstGeom prst="rect">
-            <a:avLst/>
-          </a:prstGeom>
-          <a:noFill/>
-        </p:spPr>
-        <p:txBody>
-          <a:bodyPr wrap="square" rtlCol="0">
-            <a:spAutoFit/>
-          </a:bodyPr>
-          <a:lstStyle/>
-          <a:p>
-            <a:r>
-              <a:rPr lang="es-ES" dirty="0">
-                <a:sym typeface="Wingdings" panose="05000000000000000000" pitchFamily="2" charset="2"/>
-              </a:rPr>
-              <a:t>El contenido de la tabla generada dinámicamente con estructura de condiciones </a:t>
-            </a:r>
-            <a:r>
-              <a:rPr lang="es-ES" dirty="0" err="1">
-                <a:sym typeface="Wingdings" panose="05000000000000000000" pitchFamily="2" charset="2"/>
-              </a:rPr>
-              <a:t>if</a:t>
-            </a:r>
-            <a:r>
-              <a:rPr lang="es-ES" dirty="0">
-                <a:sym typeface="Wingdings" panose="05000000000000000000" pitchFamily="2" charset="2"/>
-              </a:rPr>
-              <a:t> anidadas y bucles </a:t>
-            </a:r>
-            <a:r>
-              <a:rPr lang="es-ES" dirty="0" err="1">
-                <a:sym typeface="Wingdings" panose="05000000000000000000" pitchFamily="2" charset="2"/>
-              </a:rPr>
-              <a:t>for</a:t>
-            </a:r>
-            <a:r>
-              <a:rPr lang="es-ES" dirty="0">
-                <a:sym typeface="Wingdings" panose="05000000000000000000" pitchFamily="2" charset="2"/>
-              </a:rPr>
-              <a:t> que van creando dichos contenedores previamente definidos.</a:t>
-            </a:r>
-            <a:endParaRPr lang="es-ES" dirty="0"/>
-          </a:p>
-          <a:p>
-            <a:endParaRPr lang="es-ES" dirty="0"/>
-          </a:p>
-          <a:p>
-            <a:endParaRPr lang="es-ES" dirty="0"/>
-          </a:p>
-        </p:txBody>
-      </p:sp>
-      <p:sp>
-        <p:nvSpPr>
-          <p:cNvPr id="10" name="Subtítulo 2">
-            <a:extLst>
-              <a:ext uri="{FF2B5EF4-FFF2-40B4-BE49-F238E27FC236}">
-                <a16:creationId xmlns:a16="http://schemas.microsoft.com/office/drawing/2014/main" id="{72247B73-F17E-4E23-8FD7-BF383942789F}"/>
-              </a:ext>
-            </a:extLst>
-          </p:cNvPr>
-          <p:cNvSpPr txBox="1">
-            <a:spLocks/>
-          </p:cNvSpPr>
-          <p:nvPr/>
-        </p:nvSpPr>
-        <p:spPr>
-          <a:xfrm>
-            <a:off x="10585545" y="6018952"/>
-            <a:ext cx="1592911" cy="839048"/>
-          </a:xfrm>
-          <a:prstGeom prst="rect">
-            <a:avLst/>
-          </a:prstGeom>
-        </p:spPr>
-        <p:txBody>
-          <a:bodyPr vert="horz" lIns="91440" tIns="45720" rIns="91440" bIns="45720" rtlCol="0" anchor="t">
-            <a:normAutofit fontScale="62500" lnSpcReduction="20000"/>
-          </a:bodyPr>
-          <a:lstStyle>
-            <a:lvl1pPr marL="0" indent="0" algn="l" defTabSz="457200" rtl="0" eaLnBrk="1" latinLnBrk="0" hangingPunct="1">
-              <a:spcBef>
-                <a:spcPts val="1000"/>
-              </a:spcBef>
-              <a:spcAft>
-                <a:spcPts val="0"/>
-              </a:spcAft>
-              <a:buClr>
-                <a:schemeClr val="bg2">
-                  <a:lumMod val="40000"/>
-                  <a:lumOff val="60000"/>
-                </a:schemeClr>
-              </a:buClr>
-              <a:buSzPct val="80000"/>
-              <a:buFont typeface="Wingdings 3" charset="2"/>
-              <a:buNone/>
-              <a:defRPr sz="2000" b="0" i="0" kern="1200" cap="all">
-                <a:solidFill>
-                  <a:schemeClr val="bg2">
-                    <a:lumMod val="40000"/>
-                    <a:lumOff val="60000"/>
-                  </a:schemeClr>
-                </a:solidFill>
-                <a:latin typeface="+mj-lt"/>
-                <a:ea typeface="+mj-ea"/>
-                <a:cs typeface="+mj-cs"/>
-              </a:defRPr>
-            </a:lvl1pPr>
-            <a:lvl2pPr marL="457200" indent="0" algn="ctr" defTabSz="457200" rtl="0" eaLnBrk="1" latinLnBrk="0" hangingPunct="1">
-              <a:spcBef>
-                <a:spcPts val="1000"/>
-              </a:spcBef>
-              <a:spcAft>
-                <a:spcPts val="0"/>
-              </a:spcAft>
-              <a:buClr>
-                <a:schemeClr val="bg2">
-                  <a:lumMod val="40000"/>
-                  <a:lumOff val="60000"/>
-                </a:schemeClr>
-              </a:buClr>
-              <a:buSzPct val="80000"/>
-              <a:buFont typeface="Wingdings 3" charset="2"/>
-              <a:buNone/>
-              <a:defRPr sz="1800" b="0" i="0" kern="1200">
-                <a:solidFill>
-                  <a:schemeClr val="tx1">
-                    <a:tint val="75000"/>
-                  </a:schemeClr>
-                </a:solidFill>
-                <a:latin typeface="+mj-lt"/>
-                <a:ea typeface="+mj-ea"/>
-                <a:cs typeface="+mj-cs"/>
-              </a:defRPr>
-            </a:lvl2pPr>
-            <a:lvl3pPr marL="914400" indent="0" algn="ctr" defTabSz="457200" rtl="0" eaLnBrk="1" latinLnBrk="0" hangingPunct="1">
-              <a:spcBef>
-                <a:spcPts val="1000"/>
-              </a:spcBef>
-              <a:spcAft>
-                <a:spcPts val="0"/>
-              </a:spcAft>
-              <a:buClr>
-                <a:schemeClr val="bg2">
-                  <a:lumMod val="40000"/>
-                  <a:lumOff val="60000"/>
-                </a:schemeClr>
-              </a:buClr>
-              <a:buSzPct val="80000"/>
-              <a:buFont typeface="Wingdings 3" charset="2"/>
-              <a:buNone/>
-              <a:defRPr sz="1600" b="0" i="0" kern="1200">
-                <a:solidFill>
-                  <a:schemeClr val="tx1">
-                    <a:tint val="75000"/>
-                  </a:schemeClr>
-                </a:solidFill>
-                <a:latin typeface="+mj-lt"/>
-                <a:ea typeface="+mj-ea"/>
-                <a:cs typeface="+mj-cs"/>
-              </a:defRPr>
-            </a:lvl3pPr>
-            <a:lvl4pPr marL="1371600" indent="0" algn="ctr" defTabSz="457200" rtl="0" eaLnBrk="1" latinLnBrk="0" hangingPunct="1">
-              <a:spcBef>
-                <a:spcPts val="1000"/>
-              </a:spcBef>
-              <a:spcAft>
-                <a:spcPts val="0"/>
-              </a:spcAft>
-              <a:buClr>
-                <a:schemeClr val="bg2">
-                  <a:lumMod val="40000"/>
-                  <a:lumOff val="60000"/>
-                </a:schemeClr>
-              </a:buClr>
-              <a:buSzPct val="80000"/>
-              <a:buFont typeface="Wingdings 3" charset="2"/>
-              <a:buNone/>
-              <a:defRPr sz="1400" b="0" i="0" kern="1200">
-                <a:solidFill>
-                  <a:schemeClr val="tx1">
-                    <a:tint val="75000"/>
-                  </a:schemeClr>
-                </a:solidFill>
-                <a:latin typeface="+mj-lt"/>
-                <a:ea typeface="+mj-ea"/>
-                <a:cs typeface="+mj-cs"/>
-              </a:defRPr>
-            </a:lvl4pPr>
-            <a:lvl5pPr marL="1828800" indent="0" algn="ctr" defTabSz="457200" rtl="0" eaLnBrk="1" latinLnBrk="0" hangingPunct="1">
-              <a:spcBef>
-                <a:spcPts val="1000"/>
-              </a:spcBef>
-              <a:spcAft>
-                <a:spcPts val="0"/>
-              </a:spcAft>
-              <a:buClr>
-                <a:schemeClr val="bg2">
-                  <a:lumMod val="40000"/>
-                  <a:lumOff val="60000"/>
-                </a:schemeClr>
-              </a:buClr>
-              <a:buSzPct val="80000"/>
-              <a:buFont typeface="Wingdings 3" charset="2"/>
-              <a:buNone/>
-              <a:defRPr sz="1400" b="0" i="0" kern="1200">
-                <a:solidFill>
-                  <a:schemeClr val="tx1">
-                    <a:tint val="75000"/>
-                  </a:schemeClr>
-                </a:solidFill>
-                <a:latin typeface="+mj-lt"/>
-                <a:ea typeface="+mj-ea"/>
-                <a:cs typeface="+mj-cs"/>
-              </a:defRPr>
-            </a:lvl5pPr>
-            <a:lvl6pPr marL="2286000" indent="0" algn="ctr" defTabSz="457200" rtl="0" eaLnBrk="1" latinLnBrk="0" hangingPunct="1">
-              <a:spcBef>
-                <a:spcPts val="1000"/>
-              </a:spcBef>
-              <a:spcAft>
-                <a:spcPts val="0"/>
-              </a:spcAft>
-              <a:buClr>
-                <a:schemeClr val="bg2">
-                  <a:lumMod val="40000"/>
-                  <a:lumOff val="60000"/>
-                </a:schemeClr>
-              </a:buClr>
-              <a:buSzPct val="80000"/>
-              <a:buFont typeface="Wingdings 3" charset="2"/>
-              <a:buNone/>
-              <a:defRPr sz="1400" b="0" i="0" kern="1200">
-                <a:solidFill>
-                  <a:schemeClr val="tx1">
-                    <a:tint val="75000"/>
-                  </a:schemeClr>
-                </a:solidFill>
-                <a:latin typeface="+mj-lt"/>
-                <a:ea typeface="+mj-ea"/>
-                <a:cs typeface="+mj-cs"/>
-              </a:defRPr>
-            </a:lvl6pPr>
-            <a:lvl7pPr marL="2743200" indent="0" algn="ctr" defTabSz="457200" rtl="0" eaLnBrk="1" latinLnBrk="0" hangingPunct="1">
-              <a:spcBef>
-                <a:spcPts val="1000"/>
-              </a:spcBef>
-              <a:spcAft>
-                <a:spcPts val="0"/>
-              </a:spcAft>
-              <a:buClr>
-                <a:schemeClr val="bg2">
-                  <a:lumMod val="40000"/>
-                  <a:lumOff val="60000"/>
-                </a:schemeClr>
-              </a:buClr>
-              <a:buSzPct val="80000"/>
-              <a:buFont typeface="Wingdings 3" charset="2"/>
-              <a:buNone/>
-              <a:defRPr sz="1400" b="0" i="0" kern="1200">
-                <a:solidFill>
-                  <a:schemeClr val="tx1">
-                    <a:tint val="75000"/>
-                  </a:schemeClr>
-                </a:solidFill>
-                <a:latin typeface="+mj-lt"/>
-                <a:ea typeface="+mj-ea"/>
-                <a:cs typeface="+mj-cs"/>
-              </a:defRPr>
-            </a:lvl7pPr>
-            <a:lvl8pPr marL="3200400" indent="0" algn="ctr" defTabSz="457200" rtl="0" eaLnBrk="1" latinLnBrk="0" hangingPunct="1">
-              <a:spcBef>
-                <a:spcPts val="1000"/>
-              </a:spcBef>
-              <a:spcAft>
-                <a:spcPts val="0"/>
-              </a:spcAft>
-              <a:buClr>
-                <a:schemeClr val="bg2">
-                  <a:lumMod val="40000"/>
-                  <a:lumOff val="60000"/>
-                </a:schemeClr>
-              </a:buClr>
-              <a:buSzPct val="80000"/>
-              <a:buFont typeface="Wingdings 3" charset="2"/>
-              <a:buNone/>
-              <a:defRPr sz="1400" b="0" i="0" kern="1200">
-                <a:solidFill>
-                  <a:schemeClr val="tx1">
-                    <a:tint val="75000"/>
-                  </a:schemeClr>
-                </a:solidFill>
-                <a:latin typeface="+mj-lt"/>
-                <a:ea typeface="+mj-ea"/>
-                <a:cs typeface="+mj-cs"/>
-              </a:defRPr>
-            </a:lvl8pPr>
-            <a:lvl9pPr marL="3657600" indent="0" algn="ctr" defTabSz="457200" rtl="0" eaLnBrk="1" latinLnBrk="0" hangingPunct="1">
-              <a:spcBef>
-                <a:spcPts val="1000"/>
-              </a:spcBef>
-              <a:spcAft>
-                <a:spcPts val="0"/>
-              </a:spcAft>
-              <a:buClr>
-                <a:schemeClr val="bg2">
-                  <a:lumMod val="40000"/>
-                  <a:lumOff val="60000"/>
-                </a:schemeClr>
-              </a:buClr>
-              <a:buSzPct val="80000"/>
-              <a:buFont typeface="Wingdings 3" charset="2"/>
-              <a:buNone/>
-              <a:defRPr sz="1400" b="0" i="0" kern="1200">
-                <a:solidFill>
-                  <a:schemeClr val="tx1">
-                    <a:tint val="75000"/>
-                  </a:schemeClr>
-                </a:solidFill>
-                <a:latin typeface="+mj-lt"/>
-                <a:ea typeface="+mj-ea"/>
-                <a:cs typeface="+mj-cs"/>
-              </a:defRPr>
-            </a:lvl9pPr>
-          </a:lstStyle>
-          <a:p>
-            <a:r>
-              <a:rPr lang="es-ES" dirty="0"/>
-              <a:t>Índice--&gt;</a:t>
-            </a:r>
-          </a:p>
-          <a:p>
-            <a:r>
-              <a:rPr lang="es-ES" dirty="0"/>
-              <a:t>2. Código</a:t>
-            </a:r>
-          </a:p>
-          <a:p>
-            <a:r>
-              <a:rPr lang="es-ES" dirty="0"/>
-              <a:t>2.4 Métodos</a:t>
-            </a:r>
-          </a:p>
-        </p:txBody>
-      </p:sp>
-      <p:pic>
-        <p:nvPicPr>
-          <p:cNvPr id="3" name="Imagen 2">
-            <a:extLst>
-              <a:ext uri="{FF2B5EF4-FFF2-40B4-BE49-F238E27FC236}">
-                <a16:creationId xmlns:a16="http://schemas.microsoft.com/office/drawing/2014/main" id="{8794AE3A-47BE-4D2D-8901-B99D1733B76F}"/>
-              </a:ext>
-            </a:extLst>
-          </p:cNvPr>
-          <p:cNvPicPr>
-            <a:picLocks noChangeAspect="1"/>
-          </p:cNvPicPr>
-          <p:nvPr/>
-        </p:nvPicPr>
-        <p:blipFill>
-          <a:blip r:embed="rId2"/>
-          <a:stretch>
-            <a:fillRect/>
-          </a:stretch>
-        </p:blipFill>
-        <p:spPr>
-          <a:xfrm>
-            <a:off x="5506137" y="866775"/>
-            <a:ext cx="4566324" cy="4561205"/>
-          </a:xfrm>
-          <a:prstGeom prst="rect">
-            <a:avLst/>
-          </a:prstGeom>
-        </p:spPr>
-      </p:pic>
-    </p:spTree>
-    <p:extLst>
-      <p:ext uri="{BB962C8B-B14F-4D97-AF65-F5344CB8AC3E}">
-        <p14:creationId xmlns:p14="http://schemas.microsoft.com/office/powerpoint/2010/main" val="3973396218"/>
-      </p:ext>
-    </p:extLst>
-  </p:cSld>
-  <p:clrMapOvr>
-    <a:masterClrMapping/>
-  </p:clrMapOvr>
-</p:sld>
-</file>
-
 <file path=ppt/slides/slide2.xml><?xml version="1.0" encoding="utf-8"?>
 <p:sld xmlns:a="http://schemas.openxmlformats.org/drawingml/2006/main" xmlns:r="http://schemas.openxmlformats.org/officeDocument/2006/relationships" xmlns:p="http://schemas.openxmlformats.org/presentationml/2006/main">
   <p:cSld>
@@ -6966,13 +6549,7 @@
               <a:rPr lang="es-ES" dirty="0">
                 <a:sym typeface="Wingdings" panose="05000000000000000000" pitchFamily="2" charset="2"/>
               </a:rPr>
-              <a:t>El proyecto usa tres lenguajes de programación:   HTML5, </a:t>
-            </a:r>
-            <a:r>
-              <a:rPr lang="es-ES" dirty="0" err="1">
-                <a:sym typeface="Wingdings" panose="05000000000000000000" pitchFamily="2" charset="2"/>
-              </a:rPr>
-              <a:t>CSS,JavaScript</a:t>
+              <a:t>El proyecto usa tres lenguajes de programación:   HTML5, CSS, JavaScript</a:t>
             </a:r>
             <a:endParaRPr lang="es-ES" dirty="0"/>
           </a:p>
@@ -9851,7 +9428,7 @@
               <a:rPr lang="es-ES" dirty="0">
                 <a:sym typeface="Wingdings" panose="05000000000000000000" pitchFamily="2" charset="2"/>
               </a:rPr>
-              <a:t>El contenido de la tabla generada dinámicamente con estructura de condiciones </a:t>
+              <a:t>El contenido de la gráfica generada dinámicamente con estructura de condiciones </a:t>
             </a:r>
             <a:r>
               <a:rPr lang="es-ES" dirty="0" err="1">

</xml_diff>